<commit_message>
Feat: Create ios project presentation slides.
</commit_message>
<xml_diff>
--- a/C111118121柳健棠_IOS期末專案簡報.pptx
+++ b/C111118121柳健棠_IOS期末專案簡報.pptx
@@ -5,7 +5,7 @@
     <p:sldMasterId id="2147483648" r:id="rId1"/>
   </p:sldMasterIdLst>
   <p:notesMasterIdLst>
-    <p:notesMasterId r:id="rId8"/>
+    <p:notesMasterId r:id="rId9"/>
   </p:notesMasterIdLst>
   <p:sldIdLst>
     <p:sldId id="256" r:id="rId2"/>
@@ -13,7 +13,8 @@
     <p:sldId id="261" r:id="rId4"/>
     <p:sldId id="260" r:id="rId5"/>
     <p:sldId id="258" r:id="rId6"/>
-    <p:sldId id="259" r:id="rId7"/>
+    <p:sldId id="262" r:id="rId7"/>
+    <p:sldId id="259" r:id="rId8"/>
   </p:sldIdLst>
   <p:sldSz cx="12192000" cy="6858000"/>
   <p:notesSz cx="6858000" cy="9144000"/>
@@ -1336,6 +1337,216 @@
 </p:notes>
 </file>
 
+<file path=ppt/notesSlides/notesSlide6.xml><?xml version="1.0" encoding="utf-8"?>
+<p:notes xmlns:a="http://schemas.openxmlformats.org/drawingml/2006/main" xmlns:r="http://schemas.openxmlformats.org/officeDocument/2006/relationships" xmlns:p="http://schemas.openxmlformats.org/presentationml/2006/main">
+  <p:cSld>
+    <p:spTree>
+      <p:nvGrpSpPr>
+        <p:cNvPr id="1" name="">
+          <a:extLst>
+            <a:ext uri="{FF2B5EF4-FFF2-40B4-BE49-F238E27FC236}">
+              <a16:creationId xmlns:a16="http://schemas.microsoft.com/office/drawing/2014/main" id="{D4C0950B-57EB-821F-8326-19C08D0505BC}"/>
+            </a:ext>
+          </a:extLst>
+        </p:cNvPr>
+        <p:cNvGrpSpPr/>
+        <p:nvPr/>
+      </p:nvGrpSpPr>
+      <p:grpSpPr>
+        <a:xfrm>
+          <a:off x="0" y="0"/>
+          <a:ext cx="0" cy="0"/>
+          <a:chOff x="0" y="0"/>
+          <a:chExt cx="0" cy="0"/>
+        </a:xfrm>
+      </p:grpSpPr>
+      <p:sp>
+        <p:nvSpPr>
+          <p:cNvPr id="2" name="投影片影像版面配置區 1">
+            <a:extLst>
+              <a:ext uri="{FF2B5EF4-FFF2-40B4-BE49-F238E27FC236}">
+                <a16:creationId xmlns:a16="http://schemas.microsoft.com/office/drawing/2014/main" id="{5C14074E-B7C1-D8ED-1A21-5C85F30EAA4C}"/>
+              </a:ext>
+            </a:extLst>
+          </p:cNvPr>
+          <p:cNvSpPr>
+            <a:spLocks noGrp="1" noRot="1" noChangeAspect="1"/>
+          </p:cNvSpPr>
+          <p:nvPr>
+            <p:ph type="sldImg"/>
+          </p:nvPr>
+        </p:nvSpPr>
+        <p:spPr/>
+      </p:sp>
+      <p:sp>
+        <p:nvSpPr>
+          <p:cNvPr id="3" name="備忘稿版面配置區 2">
+            <a:extLst>
+              <a:ext uri="{FF2B5EF4-FFF2-40B4-BE49-F238E27FC236}">
+                <a16:creationId xmlns:a16="http://schemas.microsoft.com/office/drawing/2014/main" id="{9B807106-6C0B-BCBD-E8E5-68D5F2B003ED}"/>
+              </a:ext>
+            </a:extLst>
+          </p:cNvPr>
+          <p:cNvSpPr>
+            <a:spLocks noGrp="1"/>
+          </p:cNvSpPr>
+          <p:nvPr>
+            <p:ph type="body" idx="1"/>
+          </p:nvPr>
+        </p:nvSpPr>
+        <p:spPr/>
+        <p:txBody>
+          <a:bodyPr/>
+          <a:lstStyle/>
+          <a:p>
+            <a:r>
+              <a:rPr lang="zh-TW" altLang="en-US" dirty="0"/>
+              <a:t>當按下刪除時，程式會呼叫後端的 </a:t>
+            </a:r>
+            <a:r>
+              <a:rPr lang="en-US" altLang="zh-TW" sz="1200" kern="1200" dirty="0" err="1">
+                <a:solidFill>
+                  <a:schemeClr val="tx1"/>
+                </a:solidFill>
+                <a:latin typeface="+mn-lt"/>
+                <a:ea typeface="+mn-ea"/>
+                <a:cs typeface="+mn-cs"/>
+              </a:rPr>
+              <a:t>DBManager</a:t>
+            </a:r>
+            <a:r>
+              <a:rPr lang="zh-TW" altLang="en-US" dirty="0"/>
+              <a:t>，執行 </a:t>
+            </a:r>
+            <a:r>
+              <a:rPr lang="en-US" altLang="zh-TW" dirty="0"/>
+              <a:t>SQL </a:t>
+            </a:r>
+            <a:r>
+              <a:rPr lang="zh-TW" altLang="en-US" dirty="0"/>
+              <a:t>的 </a:t>
+            </a:r>
+            <a:r>
+              <a:rPr lang="en-US" altLang="zh-TW" sz="1200" kern="1200" dirty="0">
+                <a:solidFill>
+                  <a:schemeClr val="tx1"/>
+                </a:solidFill>
+                <a:latin typeface="+mn-lt"/>
+                <a:ea typeface="+mn-ea"/>
+                <a:cs typeface="+mn-cs"/>
+              </a:rPr>
+              <a:t>DELETE</a:t>
+            </a:r>
+            <a:r>
+              <a:rPr lang="zh-TW" altLang="en-US" dirty="0"/>
+              <a:t> 指令從資料庫移除該筆資料，同時透過 </a:t>
+            </a:r>
+            <a:r>
+              <a:rPr lang="en-US" altLang="zh-TW" sz="1200" kern="1200" dirty="0">
+                <a:solidFill>
+                  <a:schemeClr val="tx1"/>
+                </a:solidFill>
+                <a:latin typeface="+mn-lt"/>
+                <a:ea typeface="+mn-ea"/>
+                <a:cs typeface="+mn-cs"/>
+              </a:rPr>
+              <a:t>@State</a:t>
+            </a:r>
+            <a:r>
+              <a:rPr lang="zh-TW" altLang="en-US" dirty="0"/>
+              <a:t> 或 </a:t>
+            </a:r>
+            <a:r>
+              <a:rPr lang="en-US" altLang="zh-TW" sz="1200" kern="1200" dirty="0">
+                <a:solidFill>
+                  <a:schemeClr val="tx1"/>
+                </a:solidFill>
+                <a:latin typeface="+mn-lt"/>
+                <a:ea typeface="+mn-ea"/>
+                <a:cs typeface="+mn-cs"/>
+              </a:rPr>
+              <a:t>@Query</a:t>
+            </a:r>
+            <a:r>
+              <a:rPr lang="zh-TW" altLang="en-US" dirty="0"/>
+              <a:t> 觸發介面刷新 </a:t>
+            </a:r>
+            <a:r>
+              <a:rPr lang="en-US" altLang="zh-TW" dirty="0"/>
+              <a:t>(</a:t>
+            </a:r>
+            <a:r>
+              <a:rPr lang="en-US" altLang="zh-TW" sz="1200" kern="1200" dirty="0" err="1">
+                <a:solidFill>
+                  <a:schemeClr val="tx1"/>
+                </a:solidFill>
+                <a:latin typeface="+mn-lt"/>
+                <a:ea typeface="+mn-ea"/>
+                <a:cs typeface="+mn-cs"/>
+              </a:rPr>
+              <a:t>refresh_data</a:t>
+            </a:r>
+            <a:r>
+              <a:rPr lang="en-US" altLang="zh-TW" dirty="0"/>
+              <a:t>)</a:t>
+            </a:r>
+            <a:r>
+              <a:rPr lang="zh-TW" altLang="en-US" dirty="0"/>
+              <a:t>，讓上方的圓餅圖和結餘金額</a:t>
+            </a:r>
+            <a:r>
+              <a:rPr lang="zh-TW" altLang="en-US" b="1" dirty="0"/>
+              <a:t>即時</a:t>
+            </a:r>
+            <a:r>
+              <a:rPr lang="zh-TW" altLang="en-US" dirty="0"/>
+              <a:t>重新計算並更新。</a:t>
+            </a:r>
+          </a:p>
+        </p:txBody>
+      </p:sp>
+      <p:sp>
+        <p:nvSpPr>
+          <p:cNvPr id="4" name="投影片編號版面配置區 3">
+            <a:extLst>
+              <a:ext uri="{FF2B5EF4-FFF2-40B4-BE49-F238E27FC236}">
+                <a16:creationId xmlns:a16="http://schemas.microsoft.com/office/drawing/2014/main" id="{6C3739D6-F842-593C-FF55-33D429E91A1A}"/>
+              </a:ext>
+            </a:extLst>
+          </p:cNvPr>
+          <p:cNvSpPr>
+            <a:spLocks noGrp="1"/>
+          </p:cNvSpPr>
+          <p:nvPr>
+            <p:ph type="sldNum" sz="quarter" idx="5"/>
+          </p:nvPr>
+        </p:nvSpPr>
+        <p:spPr/>
+        <p:txBody>
+          <a:bodyPr/>
+          <a:lstStyle/>
+          <a:p>
+            <a:fld id="{21FC3E5B-6578-4B1F-8BB6-A842ADE7D21B}" type="slidenum">
+              <a:rPr lang="zh-TW" altLang="en-US" smtClean="0"/>
+              <a:t>6</a:t>
+            </a:fld>
+            <a:endParaRPr lang="zh-TW" altLang="en-US"/>
+          </a:p>
+        </p:txBody>
+      </p:sp>
+    </p:spTree>
+    <p:extLst>
+      <p:ext uri="{BB962C8B-B14F-4D97-AF65-F5344CB8AC3E}">
+        <p14:creationId xmlns:p14="http://schemas.microsoft.com/office/powerpoint/2010/main" val="1527796788"/>
+      </p:ext>
+    </p:extLst>
+  </p:cSld>
+  <p:clrMapOvr>
+    <a:masterClrMapping/>
+  </p:clrMapOvr>
+</p:notes>
+</file>
+
 <file path=ppt/slideLayouts/slideLayout1.xml><?xml version="1.0" encoding="utf-8"?>
 <p:sldLayout xmlns:a="http://schemas.openxmlformats.org/drawingml/2006/main" xmlns:r="http://schemas.openxmlformats.org/officeDocument/2006/relationships" xmlns:p="http://schemas.openxmlformats.org/presentationml/2006/main" type="title" preserve="1">
   <p:cSld name="標題投影片">
@@ -1483,7 +1694,7 @@
           <a:p>
             <a:fld id="{7C56329D-3129-4033-8742-B423D7615AFA}" type="datetimeFigureOut">
               <a:rPr lang="zh-TW" altLang="en-US" smtClean="0"/>
-              <a:t>2026/1/7</a:t>
+              <a:t>2026/1/8</a:t>
             </a:fld>
             <a:endParaRPr lang="zh-TW" altLang="en-US"/>
           </a:p>
@@ -1681,7 +1892,7 @@
           <a:p>
             <a:fld id="{7C56329D-3129-4033-8742-B423D7615AFA}" type="datetimeFigureOut">
               <a:rPr lang="zh-TW" altLang="en-US" smtClean="0"/>
-              <a:t>2026/1/7</a:t>
+              <a:t>2026/1/8</a:t>
             </a:fld>
             <a:endParaRPr lang="zh-TW" altLang="en-US"/>
           </a:p>
@@ -1889,7 +2100,7 @@
           <a:p>
             <a:fld id="{7C56329D-3129-4033-8742-B423D7615AFA}" type="datetimeFigureOut">
               <a:rPr lang="zh-TW" altLang="en-US" smtClean="0"/>
-              <a:t>2026/1/7</a:t>
+              <a:t>2026/1/8</a:t>
             </a:fld>
             <a:endParaRPr lang="zh-TW" altLang="en-US"/>
           </a:p>
@@ -2087,7 +2298,7 @@
           <a:p>
             <a:fld id="{7C56329D-3129-4033-8742-B423D7615AFA}" type="datetimeFigureOut">
               <a:rPr lang="zh-TW" altLang="en-US" smtClean="0"/>
-              <a:t>2026/1/7</a:t>
+              <a:t>2026/1/8</a:t>
             </a:fld>
             <a:endParaRPr lang="zh-TW" altLang="en-US"/>
           </a:p>
@@ -2362,7 +2573,7 @@
           <a:p>
             <a:fld id="{7C56329D-3129-4033-8742-B423D7615AFA}" type="datetimeFigureOut">
               <a:rPr lang="zh-TW" altLang="en-US" smtClean="0"/>
-              <a:t>2026/1/7</a:t>
+              <a:t>2026/1/8</a:t>
             </a:fld>
             <a:endParaRPr lang="zh-TW" altLang="en-US"/>
           </a:p>
@@ -2627,7 +2838,7 @@
           <a:p>
             <a:fld id="{7C56329D-3129-4033-8742-B423D7615AFA}" type="datetimeFigureOut">
               <a:rPr lang="zh-TW" altLang="en-US" smtClean="0"/>
-              <a:t>2026/1/7</a:t>
+              <a:t>2026/1/8</a:t>
             </a:fld>
             <a:endParaRPr lang="zh-TW" altLang="en-US"/>
           </a:p>
@@ -3039,7 +3250,7 @@
           <a:p>
             <a:fld id="{7C56329D-3129-4033-8742-B423D7615AFA}" type="datetimeFigureOut">
               <a:rPr lang="zh-TW" altLang="en-US" smtClean="0"/>
-              <a:t>2026/1/7</a:t>
+              <a:t>2026/1/8</a:t>
             </a:fld>
             <a:endParaRPr lang="zh-TW" altLang="en-US"/>
           </a:p>
@@ -3180,7 +3391,7 @@
           <a:p>
             <a:fld id="{7C56329D-3129-4033-8742-B423D7615AFA}" type="datetimeFigureOut">
               <a:rPr lang="zh-TW" altLang="en-US" smtClean="0"/>
-              <a:t>2026/1/7</a:t>
+              <a:t>2026/1/8</a:t>
             </a:fld>
             <a:endParaRPr lang="zh-TW" altLang="en-US"/>
           </a:p>
@@ -3293,7 +3504,7 @@
           <a:p>
             <a:fld id="{7C56329D-3129-4033-8742-B423D7615AFA}" type="datetimeFigureOut">
               <a:rPr lang="zh-TW" altLang="en-US" smtClean="0"/>
-              <a:t>2026/1/7</a:t>
+              <a:t>2026/1/8</a:t>
             </a:fld>
             <a:endParaRPr lang="zh-TW" altLang="en-US"/>
           </a:p>
@@ -3604,7 +3815,7 @@
           <a:p>
             <a:fld id="{7C56329D-3129-4033-8742-B423D7615AFA}" type="datetimeFigureOut">
               <a:rPr lang="zh-TW" altLang="en-US" smtClean="0"/>
-              <a:t>2026/1/7</a:t>
+              <a:t>2026/1/8</a:t>
             </a:fld>
             <a:endParaRPr lang="zh-TW" altLang="en-US"/>
           </a:p>
@@ -3892,7 +4103,7 @@
           <a:p>
             <a:fld id="{7C56329D-3129-4033-8742-B423D7615AFA}" type="datetimeFigureOut">
               <a:rPr lang="zh-TW" altLang="en-US" smtClean="0"/>
-              <a:t>2026/1/7</a:t>
+              <a:t>2026/1/8</a:t>
             </a:fld>
             <a:endParaRPr lang="zh-TW" altLang="en-US"/>
           </a:p>
@@ -4133,7 +4344,7 @@
           <a:p>
             <a:fld id="{7C56329D-3129-4033-8742-B423D7615AFA}" type="datetimeFigureOut">
               <a:rPr lang="zh-TW" altLang="en-US" smtClean="0"/>
-              <a:t>2026/1/7</a:t>
+              <a:t>2026/1/8</a:t>
             </a:fld>
             <a:endParaRPr lang="zh-TW" altLang="en-US"/>
           </a:p>
@@ -4886,8 +5097,8 @@
         </p:nvSpPr>
         <p:spPr>
           <a:xfrm>
-            <a:off x="8303391" y="2600854"/>
-            <a:ext cx="3419953" cy="2408026"/>
+            <a:off x="8303391" y="2600853"/>
+            <a:ext cx="3419953" cy="2753199"/>
           </a:xfrm>
           <a:prstGeom prst="rect">
             <a:avLst/>
@@ -5007,6 +5218,23 @@
               </a:rPr>
               <a:t>刪除記錄按鈕</a:t>
             </a:r>
+            <a:endParaRPr lang="en-US" altLang="zh-TW" sz="2800" dirty="0">
+              <a:latin typeface="Arial" panose="020B0604020202020204" pitchFamily="34" charset="0"/>
+              <a:ea typeface="微軟正黑體" panose="020B0604030504040204" pitchFamily="34" charset="-120"/>
+            </a:endParaRPr>
+          </a:p>
+          <a:p>
+            <a:r>
+              <a:rPr lang="en-US" altLang="zh-TW" sz="2800" dirty="0">
+                <a:latin typeface="Arial" panose="020B0604020202020204" pitchFamily="34" charset="0"/>
+                <a:ea typeface="微軟正黑體" panose="020B0604030504040204" pitchFamily="34" charset="-120"/>
+              </a:rPr>
+              <a:t>5.SQLITE</a:t>
+            </a:r>
+            <a:endParaRPr lang="zh-TW" altLang="en-US" sz="2800" dirty="0">
+              <a:latin typeface="Arial" panose="020B0604020202020204" pitchFamily="34" charset="0"/>
+              <a:ea typeface="微軟正黑體" panose="020B0604030504040204" pitchFamily="34" charset="-120"/>
+            </a:endParaRPr>
           </a:p>
           <a:p>
             <a:endParaRPr lang="zh-TW" altLang="en-US" sz="2800" dirty="0">
@@ -6050,6 +6278,327 @@
 </file>
 
 <file path=ppt/slides/slide6.xml><?xml version="1.0" encoding="utf-8"?>
+<p:sld xmlns:a="http://schemas.openxmlformats.org/drawingml/2006/main" xmlns:r="http://schemas.openxmlformats.org/officeDocument/2006/relationships" xmlns:p="http://schemas.openxmlformats.org/presentationml/2006/main">
+  <p:cSld>
+    <p:spTree>
+      <p:nvGrpSpPr>
+        <p:cNvPr id="1" name="">
+          <a:extLst>
+            <a:ext uri="{FF2B5EF4-FFF2-40B4-BE49-F238E27FC236}">
+              <a16:creationId xmlns:a16="http://schemas.microsoft.com/office/drawing/2014/main" id="{A5EF7416-BD80-D408-F564-E9BD5A19899B}"/>
+            </a:ext>
+          </a:extLst>
+        </p:cNvPr>
+        <p:cNvGrpSpPr/>
+        <p:nvPr/>
+      </p:nvGrpSpPr>
+      <p:grpSpPr>
+        <a:xfrm>
+          <a:off x="0" y="0"/>
+          <a:ext cx="0" cy="0"/>
+          <a:chOff x="0" y="0"/>
+          <a:chExt cx="0" cy="0"/>
+        </a:xfrm>
+      </p:grpSpPr>
+      <p:pic>
+        <p:nvPicPr>
+          <p:cNvPr id="5" name="圖片 4" descr="一張含有 行動電話, 行動裝置, 文字, 小工具 的圖片&#10;&#10;AI 產生的內容可能不正確。">
+            <a:extLst>
+              <a:ext uri="{FF2B5EF4-FFF2-40B4-BE49-F238E27FC236}">
+                <a16:creationId xmlns:a16="http://schemas.microsoft.com/office/drawing/2014/main" id="{AB158BBB-EF63-C755-B468-72963A5D5D31}"/>
+              </a:ext>
+            </a:extLst>
+          </p:cNvPr>
+          <p:cNvPicPr>
+            <a:picLocks noChangeAspect="1"/>
+          </p:cNvPicPr>
+          <p:nvPr/>
+        </p:nvPicPr>
+        <p:blipFill>
+          <a:blip r:embed="rId3"/>
+          <a:stretch>
+            <a:fillRect/>
+          </a:stretch>
+        </p:blipFill>
+        <p:spPr>
+          <a:xfrm>
+            <a:off x="199923" y="756442"/>
+            <a:ext cx="3178350" cy="6101557"/>
+          </a:xfrm>
+          <a:prstGeom prst="rect">
+            <a:avLst/>
+          </a:prstGeom>
+        </p:spPr>
+      </p:pic>
+      <p:pic>
+        <p:nvPicPr>
+          <p:cNvPr id="7" name="圖片 6" descr="一張含有 行動電話, 文字, 行動裝置, 小工具 的圖片&#10;&#10;AI 產生的內容可能不正確。">
+            <a:extLst>
+              <a:ext uri="{FF2B5EF4-FFF2-40B4-BE49-F238E27FC236}">
+                <a16:creationId xmlns:a16="http://schemas.microsoft.com/office/drawing/2014/main" id="{5BA5B992-D36D-D78E-09FA-16CC0988BC31}"/>
+              </a:ext>
+            </a:extLst>
+          </p:cNvPr>
+          <p:cNvPicPr>
+            <a:picLocks noChangeAspect="1"/>
+          </p:cNvPicPr>
+          <p:nvPr/>
+        </p:nvPicPr>
+        <p:blipFill>
+          <a:blip r:embed="rId4"/>
+          <a:stretch>
+            <a:fillRect/>
+          </a:stretch>
+        </p:blipFill>
+        <p:spPr>
+          <a:xfrm>
+            <a:off x="3772309" y="756442"/>
+            <a:ext cx="3197451" cy="6101557"/>
+          </a:xfrm>
+          <a:prstGeom prst="rect">
+            <a:avLst/>
+          </a:prstGeom>
+        </p:spPr>
+      </p:pic>
+      <p:pic>
+        <p:nvPicPr>
+          <p:cNvPr id="9" name="圖形 8" descr="游標 以實心填滿">
+            <a:extLst>
+              <a:ext uri="{FF2B5EF4-FFF2-40B4-BE49-F238E27FC236}">
+                <a16:creationId xmlns:a16="http://schemas.microsoft.com/office/drawing/2014/main" id="{53B122B3-0F64-91B5-08B0-090BEA713623}"/>
+              </a:ext>
+            </a:extLst>
+          </p:cNvPr>
+          <p:cNvPicPr>
+            <a:picLocks noChangeAspect="1"/>
+          </p:cNvPicPr>
+          <p:nvPr/>
+        </p:nvPicPr>
+        <p:blipFill>
+          <a:blip r:embed="rId5">
+            <a:extLst>
+              <a:ext uri="{96DAC541-7B7A-43D3-8B79-37D633B846F1}">
+                <asvg:svgBlip xmlns:asvg="http://schemas.microsoft.com/office/drawing/2016/SVG/main" r:embed="rId6"/>
+              </a:ext>
+            </a:extLst>
+          </a:blip>
+          <a:stretch>
+            <a:fillRect/>
+          </a:stretch>
+        </p:blipFill>
+        <p:spPr>
+          <a:xfrm>
+            <a:off x="2680383" y="4103637"/>
+            <a:ext cx="520018" cy="520018"/>
+          </a:xfrm>
+          <a:prstGeom prst="rect">
+            <a:avLst/>
+          </a:prstGeom>
+        </p:spPr>
+      </p:pic>
+      <p:sp>
+        <p:nvSpPr>
+          <p:cNvPr id="13" name="標題 1">
+            <a:extLst>
+              <a:ext uri="{FF2B5EF4-FFF2-40B4-BE49-F238E27FC236}">
+                <a16:creationId xmlns:a16="http://schemas.microsoft.com/office/drawing/2014/main" id="{59D54011-D222-7C19-09E6-B9E47FB5156D}"/>
+              </a:ext>
+            </a:extLst>
+          </p:cNvPr>
+          <p:cNvSpPr txBox="1">
+            <a:spLocks/>
+          </p:cNvSpPr>
+          <p:nvPr/>
+        </p:nvSpPr>
+        <p:spPr>
+          <a:xfrm>
+            <a:off x="0" y="1"/>
+            <a:ext cx="12192000" cy="701038"/>
+          </a:xfrm>
+          <a:prstGeom prst="rect">
+            <a:avLst/>
+          </a:prstGeom>
+          <a:solidFill>
+            <a:schemeClr val="bg1">
+              <a:lumMod val="50000"/>
+            </a:schemeClr>
+          </a:solidFill>
+        </p:spPr>
+        <p:txBody>
+          <a:bodyPr vert="horz" lIns="91440" tIns="45720" rIns="91440" bIns="45720" rtlCol="0" anchor="ctr">
+            <a:normAutofit/>
+          </a:bodyPr>
+          <a:lstStyle>
+            <a:lvl1pPr algn="l" defTabSz="914400" rtl="0" eaLnBrk="1" latinLnBrk="0" hangingPunct="1">
+              <a:lnSpc>
+                <a:spcPct val="90000"/>
+              </a:lnSpc>
+              <a:spcBef>
+                <a:spcPct val="0"/>
+              </a:spcBef>
+              <a:buNone/>
+              <a:defRPr sz="4400" kern="1200">
+                <a:solidFill>
+                  <a:schemeClr val="tx1"/>
+                </a:solidFill>
+                <a:latin typeface="+mj-lt"/>
+                <a:ea typeface="+mj-ea"/>
+                <a:cs typeface="+mj-cs"/>
+              </a:defRPr>
+            </a:lvl1pPr>
+          </a:lstStyle>
+          <a:p>
+            <a:pPr algn="ctr">
+              <a:lnSpc>
+                <a:spcPts val="4000"/>
+              </a:lnSpc>
+            </a:pPr>
+            <a:r>
+              <a:rPr lang="zh-TW" altLang="en-US" sz="3200" dirty="0">
+                <a:solidFill>
+                  <a:schemeClr val="bg1"/>
+                </a:solidFill>
+                <a:latin typeface="Arial" panose="020B0604020202020204" pitchFamily="34" charset="0"/>
+                <a:ea typeface="微軟正黑體" panose="020B0604030504040204" pitchFamily="34" charset="-120"/>
+              </a:rPr>
+              <a:t>專案展示</a:t>
+            </a:r>
+          </a:p>
+        </p:txBody>
+      </p:sp>
+      <p:sp>
+        <p:nvSpPr>
+          <p:cNvPr id="14" name="標題 1">
+            <a:extLst>
+              <a:ext uri="{FF2B5EF4-FFF2-40B4-BE49-F238E27FC236}">
+                <a16:creationId xmlns:a16="http://schemas.microsoft.com/office/drawing/2014/main" id="{093F271D-5378-4C3C-B786-04070B80AC8C}"/>
+              </a:ext>
+            </a:extLst>
+          </p:cNvPr>
+          <p:cNvSpPr txBox="1">
+            <a:spLocks/>
+          </p:cNvSpPr>
+          <p:nvPr/>
+        </p:nvSpPr>
+        <p:spPr>
+          <a:xfrm>
+            <a:off x="6822325" y="2754363"/>
+            <a:ext cx="5369675" cy="1349274"/>
+          </a:xfrm>
+          <a:prstGeom prst="rect">
+            <a:avLst/>
+          </a:prstGeom>
+        </p:spPr>
+        <p:txBody>
+          <a:bodyPr vert="horz" lIns="91440" tIns="45720" rIns="91440" bIns="45720" rtlCol="0" anchor="t">
+            <a:normAutofit/>
+          </a:bodyPr>
+          <a:lstStyle>
+            <a:lvl1pPr algn="l" defTabSz="914400" rtl="0" eaLnBrk="1" latinLnBrk="0" hangingPunct="1">
+              <a:lnSpc>
+                <a:spcPct val="90000"/>
+              </a:lnSpc>
+              <a:spcBef>
+                <a:spcPct val="0"/>
+              </a:spcBef>
+              <a:buNone/>
+              <a:defRPr sz="4400" kern="1200">
+                <a:solidFill>
+                  <a:schemeClr val="tx1"/>
+                </a:solidFill>
+                <a:latin typeface="+mj-lt"/>
+                <a:ea typeface="+mj-ea"/>
+                <a:cs typeface="+mj-cs"/>
+              </a:defRPr>
+            </a:lvl1pPr>
+          </a:lstStyle>
+          <a:p>
+            <a:r>
+              <a:rPr lang="zh-TW" altLang="en-US" sz="3200" b="1" dirty="0">
+                <a:latin typeface="Arial" panose="020B0604020202020204" pitchFamily="34" charset="0"/>
+                <a:ea typeface="微軟正黑體" panose="020B0604030504040204" pitchFamily="34" charset="-120"/>
+              </a:rPr>
+              <a:t>刪除記錄功能：</a:t>
+            </a:r>
+            <a:endParaRPr lang="en-US" altLang="zh-TW" sz="3200" b="1" dirty="0">
+              <a:latin typeface="Arial" panose="020B0604020202020204" pitchFamily="34" charset="0"/>
+              <a:ea typeface="微軟正黑體" panose="020B0604030504040204" pitchFamily="34" charset="-120"/>
+            </a:endParaRPr>
+          </a:p>
+          <a:p>
+            <a:r>
+              <a:rPr lang="zh-TW" altLang="en-US" sz="2800" dirty="0">
+                <a:latin typeface="Arial" panose="020B0604020202020204" pitchFamily="34" charset="0"/>
+                <a:ea typeface="微軟正黑體" panose="020B0604030504040204" pitchFamily="34" charset="-120"/>
+              </a:rPr>
+              <a:t>按下記錄旁邊的刪除按鈕把該筆記錄刪除。</a:t>
+            </a:r>
+          </a:p>
+        </p:txBody>
+      </p:sp>
+      <p:sp>
+        <p:nvSpPr>
+          <p:cNvPr id="15" name="箭號: 向右 14">
+            <a:extLst>
+              <a:ext uri="{FF2B5EF4-FFF2-40B4-BE49-F238E27FC236}">
+                <a16:creationId xmlns:a16="http://schemas.microsoft.com/office/drawing/2014/main" id="{51643FB9-EBDA-E4A3-8E13-D5A20486E7FD}"/>
+              </a:ext>
+            </a:extLst>
+          </p:cNvPr>
+          <p:cNvSpPr/>
+          <p:nvPr/>
+        </p:nvSpPr>
+        <p:spPr>
+          <a:xfrm>
+            <a:off x="3251273" y="3664980"/>
+            <a:ext cx="579120" cy="284480"/>
+          </a:xfrm>
+          <a:prstGeom prst="rightArrow">
+            <a:avLst/>
+          </a:prstGeom>
+          <a:solidFill>
+            <a:schemeClr val="tx1"/>
+          </a:solidFill>
+        </p:spPr>
+        <p:style>
+          <a:lnRef idx="2">
+            <a:schemeClr val="accent1">
+              <a:shade val="15000"/>
+            </a:schemeClr>
+          </a:lnRef>
+          <a:fillRef idx="1">
+            <a:schemeClr val="accent1"/>
+          </a:fillRef>
+          <a:effectRef idx="0">
+            <a:schemeClr val="accent1"/>
+          </a:effectRef>
+          <a:fontRef idx="minor">
+            <a:schemeClr val="lt1"/>
+          </a:fontRef>
+        </p:style>
+        <p:txBody>
+          <a:bodyPr rtlCol="0" anchor="ctr"/>
+          <a:lstStyle/>
+          <a:p>
+            <a:pPr algn="ctr"/>
+            <a:endParaRPr lang="zh-TW" altLang="en-US"/>
+          </a:p>
+        </p:txBody>
+      </p:sp>
+    </p:spTree>
+    <p:extLst>
+      <p:ext uri="{BB962C8B-B14F-4D97-AF65-F5344CB8AC3E}">
+        <p14:creationId xmlns:p14="http://schemas.microsoft.com/office/powerpoint/2010/main" val="641488597"/>
+      </p:ext>
+    </p:extLst>
+  </p:cSld>
+  <p:clrMapOvr>
+    <a:masterClrMapping/>
+  </p:clrMapOvr>
+</p:sld>
+</file>
+
+<file path=ppt/slides/slide7.xml><?xml version="1.0" encoding="utf-8"?>
 <p:sld xmlns:a="http://schemas.openxmlformats.org/drawingml/2006/main" xmlns:r="http://schemas.openxmlformats.org/officeDocument/2006/relationships" xmlns:p="http://schemas.openxmlformats.org/presentationml/2006/main">
   <p:cSld>
     <p:spTree>

</xml_diff>

<commit_message>
Fix: Remove a slide.
</commit_message>
<xml_diff>
--- a/C111118121柳健棠_IOS期末專案簡報.pptx
+++ b/C111118121柳健棠_IOS期末專案簡報.pptx
@@ -5,16 +5,15 @@
     <p:sldMasterId id="2147483648" r:id="rId1"/>
   </p:sldMasterIdLst>
   <p:notesMasterIdLst>
-    <p:notesMasterId r:id="rId9"/>
+    <p:notesMasterId r:id="rId8"/>
   </p:notesMasterIdLst>
   <p:sldIdLst>
     <p:sldId id="256" r:id="rId2"/>
     <p:sldId id="257" r:id="rId3"/>
     <p:sldId id="261" r:id="rId4"/>
     <p:sldId id="260" r:id="rId5"/>
-    <p:sldId id="258" r:id="rId6"/>
-    <p:sldId id="262" r:id="rId7"/>
-    <p:sldId id="259" r:id="rId8"/>
+    <p:sldId id="262" r:id="rId6"/>
+    <p:sldId id="259" r:id="rId7"/>
   </p:sldIdLst>
   <p:sldSz cx="12192000" cy="6858000"/>
   <p:notesSz cx="6858000" cy="9144000"/>
@@ -1156,192 +1155,6 @@
   <p:cSld>
     <p:spTree>
       <p:nvGrpSpPr>
-        <p:cNvPr id="1" name=""/>
-        <p:cNvGrpSpPr/>
-        <p:nvPr/>
-      </p:nvGrpSpPr>
-      <p:grpSpPr>
-        <a:xfrm>
-          <a:off x="0" y="0"/>
-          <a:ext cx="0" cy="0"/>
-          <a:chOff x="0" y="0"/>
-          <a:chExt cx="0" cy="0"/>
-        </a:xfrm>
-      </p:grpSpPr>
-      <p:sp>
-        <p:nvSpPr>
-          <p:cNvPr id="2" name="投影片影像版面配置區 1"/>
-          <p:cNvSpPr>
-            <a:spLocks noGrp="1" noRot="1" noChangeAspect="1"/>
-          </p:cNvSpPr>
-          <p:nvPr>
-            <p:ph type="sldImg"/>
-          </p:nvPr>
-        </p:nvSpPr>
-        <p:spPr/>
-      </p:sp>
-      <p:sp>
-        <p:nvSpPr>
-          <p:cNvPr id="3" name="備忘稿版面配置區 2"/>
-          <p:cNvSpPr>
-            <a:spLocks noGrp="1"/>
-          </p:cNvSpPr>
-          <p:nvPr>
-            <p:ph type="body" idx="1"/>
-          </p:nvPr>
-        </p:nvSpPr>
-        <p:spPr/>
-        <p:txBody>
-          <a:bodyPr/>
-          <a:lstStyle/>
-          <a:p>
-            <a:r>
-              <a:rPr lang="zh-TW" altLang="en-US" dirty="0"/>
-              <a:t>當按下刪除時，程式會呼叫後端的 </a:t>
-            </a:r>
-            <a:r>
-              <a:rPr lang="en-US" altLang="zh-TW" sz="1200" kern="1200" dirty="0" err="1">
-                <a:solidFill>
-                  <a:schemeClr val="tx1"/>
-                </a:solidFill>
-                <a:latin typeface="+mn-lt"/>
-                <a:ea typeface="+mn-ea"/>
-                <a:cs typeface="+mn-cs"/>
-              </a:rPr>
-              <a:t>DBManager</a:t>
-            </a:r>
-            <a:r>
-              <a:rPr lang="zh-TW" altLang="en-US" dirty="0"/>
-              <a:t>，執行 </a:t>
-            </a:r>
-            <a:r>
-              <a:rPr lang="en-US" altLang="zh-TW" dirty="0"/>
-              <a:t>SQL </a:t>
-            </a:r>
-            <a:r>
-              <a:rPr lang="zh-TW" altLang="en-US" dirty="0"/>
-              <a:t>的 </a:t>
-            </a:r>
-            <a:r>
-              <a:rPr lang="en-US" altLang="zh-TW" sz="1200" kern="1200" dirty="0">
-                <a:solidFill>
-                  <a:schemeClr val="tx1"/>
-                </a:solidFill>
-                <a:latin typeface="+mn-lt"/>
-                <a:ea typeface="+mn-ea"/>
-                <a:cs typeface="+mn-cs"/>
-              </a:rPr>
-              <a:t>DELETE</a:t>
-            </a:r>
-            <a:r>
-              <a:rPr lang="zh-TW" altLang="en-US" dirty="0"/>
-              <a:t> 指令從資料庫移除該筆資料，同時透過 </a:t>
-            </a:r>
-            <a:r>
-              <a:rPr lang="en-US" altLang="zh-TW" sz="1200" kern="1200" dirty="0">
-                <a:solidFill>
-                  <a:schemeClr val="tx1"/>
-                </a:solidFill>
-                <a:latin typeface="+mn-lt"/>
-                <a:ea typeface="+mn-ea"/>
-                <a:cs typeface="+mn-cs"/>
-              </a:rPr>
-              <a:t>@State</a:t>
-            </a:r>
-            <a:r>
-              <a:rPr lang="zh-TW" altLang="en-US" dirty="0"/>
-              <a:t> 或 </a:t>
-            </a:r>
-            <a:r>
-              <a:rPr lang="en-US" altLang="zh-TW" sz="1200" kern="1200" dirty="0">
-                <a:solidFill>
-                  <a:schemeClr val="tx1"/>
-                </a:solidFill>
-                <a:latin typeface="+mn-lt"/>
-                <a:ea typeface="+mn-ea"/>
-                <a:cs typeface="+mn-cs"/>
-              </a:rPr>
-              <a:t>@Query</a:t>
-            </a:r>
-            <a:r>
-              <a:rPr lang="zh-TW" altLang="en-US" dirty="0"/>
-              <a:t> 觸發介面刷新 </a:t>
-            </a:r>
-            <a:r>
-              <a:rPr lang="en-US" altLang="zh-TW" dirty="0"/>
-              <a:t>(</a:t>
-            </a:r>
-            <a:r>
-              <a:rPr lang="en-US" altLang="zh-TW" sz="1200" kern="1200" dirty="0" err="1">
-                <a:solidFill>
-                  <a:schemeClr val="tx1"/>
-                </a:solidFill>
-                <a:latin typeface="+mn-lt"/>
-                <a:ea typeface="+mn-ea"/>
-                <a:cs typeface="+mn-cs"/>
-              </a:rPr>
-              <a:t>refresh_data</a:t>
-            </a:r>
-            <a:r>
-              <a:rPr lang="en-US" altLang="zh-TW" dirty="0"/>
-              <a:t>)</a:t>
-            </a:r>
-            <a:r>
-              <a:rPr lang="zh-TW" altLang="en-US" dirty="0"/>
-              <a:t>，讓上方的圓餅圖和結餘金額</a:t>
-            </a:r>
-            <a:r>
-              <a:rPr lang="zh-TW" altLang="en-US" b="1" dirty="0"/>
-              <a:t>即時</a:t>
-            </a:r>
-            <a:r>
-              <a:rPr lang="zh-TW" altLang="en-US" dirty="0"/>
-              <a:t>重新計算並更新。</a:t>
-            </a:r>
-          </a:p>
-        </p:txBody>
-      </p:sp>
-      <p:sp>
-        <p:nvSpPr>
-          <p:cNvPr id="4" name="投影片編號版面配置區 3"/>
-          <p:cNvSpPr>
-            <a:spLocks noGrp="1"/>
-          </p:cNvSpPr>
-          <p:nvPr>
-            <p:ph type="sldNum" sz="quarter" idx="5"/>
-          </p:nvPr>
-        </p:nvSpPr>
-        <p:spPr/>
-        <p:txBody>
-          <a:bodyPr/>
-          <a:lstStyle/>
-          <a:p>
-            <a:fld id="{21FC3E5B-6578-4B1F-8BB6-A842ADE7D21B}" type="slidenum">
-              <a:rPr lang="zh-TW" altLang="en-US" smtClean="0"/>
-              <a:t>5</a:t>
-            </a:fld>
-            <a:endParaRPr lang="zh-TW" altLang="en-US"/>
-          </a:p>
-        </p:txBody>
-      </p:sp>
-    </p:spTree>
-    <p:extLst>
-      <p:ext uri="{BB962C8B-B14F-4D97-AF65-F5344CB8AC3E}">
-        <p14:creationId xmlns:p14="http://schemas.microsoft.com/office/powerpoint/2010/main" val="521971752"/>
-      </p:ext>
-    </p:extLst>
-  </p:cSld>
-  <p:clrMapOvr>
-    <a:masterClrMapping/>
-  </p:clrMapOvr>
-</p:notes>
-</file>
-
-<file path=ppt/notesSlides/notesSlide6.xml><?xml version="1.0" encoding="utf-8"?>
-<p:notes xmlns:a="http://schemas.openxmlformats.org/drawingml/2006/main" xmlns:r="http://schemas.openxmlformats.org/officeDocument/2006/relationships" xmlns:p="http://schemas.openxmlformats.org/presentationml/2006/main">
-  <p:cSld>
-    <p:spTree>
-      <p:nvGrpSpPr>
         <p:cNvPr id="1" name="">
           <a:extLst>
             <a:ext uri="{FF2B5EF4-FFF2-40B4-BE49-F238E27FC236}">
@@ -1453,12 +1266,8 @@
               <a:t>@State</a:t>
             </a:r>
             <a:r>
-              <a:rPr lang="zh-TW" altLang="en-US"/>
-              <a:t> 觸發</a:t>
-            </a:r>
-            <a:r>
               <a:rPr lang="zh-TW" altLang="en-US" dirty="0"/>
-              <a:t>介面刷新 </a:t>
+              <a:t> 觸發介面刷新 </a:t>
             </a:r>
             <a:r>
               <a:rPr lang="en-US" altLang="zh-TW" dirty="0"/>
@@ -1517,7 +1326,7 @@
           <a:p>
             <a:fld id="{21FC3E5B-6578-4B1F-8BB6-A842ADE7D21B}" type="slidenum">
               <a:rPr lang="zh-TW" altLang="en-US" smtClean="0"/>
-              <a:t>6</a:t>
+              <a:t>5</a:t>
             </a:fld>
             <a:endParaRPr lang="zh-TW" altLang="en-US"/>
           </a:p>
@@ -5956,7 +5765,13 @@
   <p:cSld>
     <p:spTree>
       <p:nvGrpSpPr>
-        <p:cNvPr id="1" name=""/>
+        <p:cNvPr id="1" name="">
+          <a:extLst>
+            <a:ext uri="{FF2B5EF4-FFF2-40B4-BE49-F238E27FC236}">
+              <a16:creationId xmlns:a16="http://schemas.microsoft.com/office/drawing/2014/main" id="{A5EF7416-BD80-D408-F564-E9BD5A19899B}"/>
+            </a:ext>
+          </a:extLst>
+        </p:cNvPr>
         <p:cNvGrpSpPr/>
         <p:nvPr/>
       </p:nvGrpSpPr>
@@ -5973,7 +5788,7 @@
           <p:cNvPr id="5" name="圖片 4" descr="一張含有 行動電話, 行動裝置, 文字, 小工具 的圖片&#10;&#10;AI 產生的內容可能不正確。">
             <a:extLst>
               <a:ext uri="{FF2B5EF4-FFF2-40B4-BE49-F238E27FC236}">
-                <a16:creationId xmlns:a16="http://schemas.microsoft.com/office/drawing/2014/main" id="{99A8D44B-F092-655C-C3AA-88A9304CEDBF}"/>
+                <a16:creationId xmlns:a16="http://schemas.microsoft.com/office/drawing/2014/main" id="{AB158BBB-EF63-C755-B468-72963A5D5D31}"/>
               </a:ext>
             </a:extLst>
           </p:cNvPr>
@@ -6003,7 +5818,7 @@
           <p:cNvPr id="7" name="圖片 6" descr="一張含有 行動電話, 文字, 行動裝置, 小工具 的圖片&#10;&#10;AI 產生的內容可能不正確。">
             <a:extLst>
               <a:ext uri="{FF2B5EF4-FFF2-40B4-BE49-F238E27FC236}">
-                <a16:creationId xmlns:a16="http://schemas.microsoft.com/office/drawing/2014/main" id="{0CD59690-CDA5-5BD5-4224-C12C906A4FA0}"/>
+                <a16:creationId xmlns:a16="http://schemas.microsoft.com/office/drawing/2014/main" id="{5BA5B992-D36D-D78E-09FA-16CC0988BC31}"/>
               </a:ext>
             </a:extLst>
           </p:cNvPr>
@@ -6033,7 +5848,7 @@
           <p:cNvPr id="9" name="圖形 8" descr="游標 以實心填滿">
             <a:extLst>
               <a:ext uri="{FF2B5EF4-FFF2-40B4-BE49-F238E27FC236}">
-                <a16:creationId xmlns:a16="http://schemas.microsoft.com/office/drawing/2014/main" id="{59C68089-FF68-8823-FA0F-203E719D3B4C}"/>
+                <a16:creationId xmlns:a16="http://schemas.microsoft.com/office/drawing/2014/main" id="{53B122B3-0F64-91B5-08B0-090BEA713623}"/>
               </a:ext>
             </a:extLst>
           </p:cNvPr>
@@ -6069,7 +5884,7 @@
           <p:cNvPr id="13" name="標題 1">
             <a:extLst>
               <a:ext uri="{FF2B5EF4-FFF2-40B4-BE49-F238E27FC236}">
-                <a16:creationId xmlns:a16="http://schemas.microsoft.com/office/drawing/2014/main" id="{9C018DC1-F432-72FF-061D-6AB0F916FF35}"/>
+                <a16:creationId xmlns:a16="http://schemas.microsoft.com/office/drawing/2014/main" id="{59D54011-D222-7C19-09E6-B9E47FB5156D}"/>
               </a:ext>
             </a:extLst>
           </p:cNvPr>
@@ -6139,7 +5954,7 @@
           <p:cNvPr id="14" name="標題 1">
             <a:extLst>
               <a:ext uri="{FF2B5EF4-FFF2-40B4-BE49-F238E27FC236}">
-                <a16:creationId xmlns:a16="http://schemas.microsoft.com/office/drawing/2014/main" id="{EF31BF0F-A89A-35A8-5961-1FCB9952A6FE}"/>
+                <a16:creationId xmlns:a16="http://schemas.microsoft.com/office/drawing/2014/main" id="{093F271D-5378-4C3C-B786-04070B80AC8C}"/>
               </a:ext>
             </a:extLst>
           </p:cNvPr>
@@ -6209,7 +6024,7 @@
           <p:cNvPr id="15" name="箭號: 向右 14">
             <a:extLst>
               <a:ext uri="{FF2B5EF4-FFF2-40B4-BE49-F238E27FC236}">
-                <a16:creationId xmlns:a16="http://schemas.microsoft.com/office/drawing/2014/main" id="{F60C8931-2FAF-32CF-E938-3ACDC48B8E6B}"/>
+                <a16:creationId xmlns:a16="http://schemas.microsoft.com/office/drawing/2014/main" id="{51643FB9-EBDA-E4A3-8E13-D5A20486E7FD}"/>
               </a:ext>
             </a:extLst>
           </p:cNvPr>
@@ -6256,7 +6071,7 @@
     </p:spTree>
     <p:extLst>
       <p:ext uri="{BB962C8B-B14F-4D97-AF65-F5344CB8AC3E}">
-        <p14:creationId xmlns:p14="http://schemas.microsoft.com/office/powerpoint/2010/main" val="2579344487"/>
+        <p14:creationId xmlns:p14="http://schemas.microsoft.com/office/powerpoint/2010/main" val="641488597"/>
       </p:ext>
     </p:extLst>
   </p:cSld>
@@ -6267,327 +6082,6 @@
 </file>
 
 <file path=ppt/slides/slide6.xml><?xml version="1.0" encoding="utf-8"?>
-<p:sld xmlns:a="http://schemas.openxmlformats.org/drawingml/2006/main" xmlns:r="http://schemas.openxmlformats.org/officeDocument/2006/relationships" xmlns:p="http://schemas.openxmlformats.org/presentationml/2006/main">
-  <p:cSld>
-    <p:spTree>
-      <p:nvGrpSpPr>
-        <p:cNvPr id="1" name="">
-          <a:extLst>
-            <a:ext uri="{FF2B5EF4-FFF2-40B4-BE49-F238E27FC236}">
-              <a16:creationId xmlns:a16="http://schemas.microsoft.com/office/drawing/2014/main" id="{A5EF7416-BD80-D408-F564-E9BD5A19899B}"/>
-            </a:ext>
-          </a:extLst>
-        </p:cNvPr>
-        <p:cNvGrpSpPr/>
-        <p:nvPr/>
-      </p:nvGrpSpPr>
-      <p:grpSpPr>
-        <a:xfrm>
-          <a:off x="0" y="0"/>
-          <a:ext cx="0" cy="0"/>
-          <a:chOff x="0" y="0"/>
-          <a:chExt cx="0" cy="0"/>
-        </a:xfrm>
-      </p:grpSpPr>
-      <p:pic>
-        <p:nvPicPr>
-          <p:cNvPr id="5" name="圖片 4" descr="一張含有 行動電話, 行動裝置, 文字, 小工具 的圖片&#10;&#10;AI 產生的內容可能不正確。">
-            <a:extLst>
-              <a:ext uri="{FF2B5EF4-FFF2-40B4-BE49-F238E27FC236}">
-                <a16:creationId xmlns:a16="http://schemas.microsoft.com/office/drawing/2014/main" id="{AB158BBB-EF63-C755-B468-72963A5D5D31}"/>
-              </a:ext>
-            </a:extLst>
-          </p:cNvPr>
-          <p:cNvPicPr>
-            <a:picLocks noChangeAspect="1"/>
-          </p:cNvPicPr>
-          <p:nvPr/>
-        </p:nvPicPr>
-        <p:blipFill>
-          <a:blip r:embed="rId3"/>
-          <a:stretch>
-            <a:fillRect/>
-          </a:stretch>
-        </p:blipFill>
-        <p:spPr>
-          <a:xfrm>
-            <a:off x="199923" y="756442"/>
-            <a:ext cx="3178350" cy="6101557"/>
-          </a:xfrm>
-          <a:prstGeom prst="rect">
-            <a:avLst/>
-          </a:prstGeom>
-        </p:spPr>
-      </p:pic>
-      <p:pic>
-        <p:nvPicPr>
-          <p:cNvPr id="7" name="圖片 6" descr="一張含有 行動電話, 文字, 行動裝置, 小工具 的圖片&#10;&#10;AI 產生的內容可能不正確。">
-            <a:extLst>
-              <a:ext uri="{FF2B5EF4-FFF2-40B4-BE49-F238E27FC236}">
-                <a16:creationId xmlns:a16="http://schemas.microsoft.com/office/drawing/2014/main" id="{5BA5B992-D36D-D78E-09FA-16CC0988BC31}"/>
-              </a:ext>
-            </a:extLst>
-          </p:cNvPr>
-          <p:cNvPicPr>
-            <a:picLocks noChangeAspect="1"/>
-          </p:cNvPicPr>
-          <p:nvPr/>
-        </p:nvPicPr>
-        <p:blipFill>
-          <a:blip r:embed="rId4"/>
-          <a:stretch>
-            <a:fillRect/>
-          </a:stretch>
-        </p:blipFill>
-        <p:spPr>
-          <a:xfrm>
-            <a:off x="3772309" y="756442"/>
-            <a:ext cx="3197451" cy="6101557"/>
-          </a:xfrm>
-          <a:prstGeom prst="rect">
-            <a:avLst/>
-          </a:prstGeom>
-        </p:spPr>
-      </p:pic>
-      <p:pic>
-        <p:nvPicPr>
-          <p:cNvPr id="9" name="圖形 8" descr="游標 以實心填滿">
-            <a:extLst>
-              <a:ext uri="{FF2B5EF4-FFF2-40B4-BE49-F238E27FC236}">
-                <a16:creationId xmlns:a16="http://schemas.microsoft.com/office/drawing/2014/main" id="{53B122B3-0F64-91B5-08B0-090BEA713623}"/>
-              </a:ext>
-            </a:extLst>
-          </p:cNvPr>
-          <p:cNvPicPr>
-            <a:picLocks noChangeAspect="1"/>
-          </p:cNvPicPr>
-          <p:nvPr/>
-        </p:nvPicPr>
-        <p:blipFill>
-          <a:blip r:embed="rId5">
-            <a:extLst>
-              <a:ext uri="{96DAC541-7B7A-43D3-8B79-37D633B846F1}">
-                <asvg:svgBlip xmlns:asvg="http://schemas.microsoft.com/office/drawing/2016/SVG/main" r:embed="rId6"/>
-              </a:ext>
-            </a:extLst>
-          </a:blip>
-          <a:stretch>
-            <a:fillRect/>
-          </a:stretch>
-        </p:blipFill>
-        <p:spPr>
-          <a:xfrm>
-            <a:off x="2680383" y="4103637"/>
-            <a:ext cx="520018" cy="520018"/>
-          </a:xfrm>
-          <a:prstGeom prst="rect">
-            <a:avLst/>
-          </a:prstGeom>
-        </p:spPr>
-      </p:pic>
-      <p:sp>
-        <p:nvSpPr>
-          <p:cNvPr id="13" name="標題 1">
-            <a:extLst>
-              <a:ext uri="{FF2B5EF4-FFF2-40B4-BE49-F238E27FC236}">
-                <a16:creationId xmlns:a16="http://schemas.microsoft.com/office/drawing/2014/main" id="{59D54011-D222-7C19-09E6-B9E47FB5156D}"/>
-              </a:ext>
-            </a:extLst>
-          </p:cNvPr>
-          <p:cNvSpPr txBox="1">
-            <a:spLocks/>
-          </p:cNvSpPr>
-          <p:nvPr/>
-        </p:nvSpPr>
-        <p:spPr>
-          <a:xfrm>
-            <a:off x="0" y="1"/>
-            <a:ext cx="12192000" cy="701038"/>
-          </a:xfrm>
-          <a:prstGeom prst="rect">
-            <a:avLst/>
-          </a:prstGeom>
-          <a:solidFill>
-            <a:schemeClr val="bg1">
-              <a:lumMod val="50000"/>
-            </a:schemeClr>
-          </a:solidFill>
-        </p:spPr>
-        <p:txBody>
-          <a:bodyPr vert="horz" lIns="91440" tIns="45720" rIns="91440" bIns="45720" rtlCol="0" anchor="ctr">
-            <a:normAutofit/>
-          </a:bodyPr>
-          <a:lstStyle>
-            <a:lvl1pPr algn="l" defTabSz="914400" rtl="0" eaLnBrk="1" latinLnBrk="0" hangingPunct="1">
-              <a:lnSpc>
-                <a:spcPct val="90000"/>
-              </a:lnSpc>
-              <a:spcBef>
-                <a:spcPct val="0"/>
-              </a:spcBef>
-              <a:buNone/>
-              <a:defRPr sz="4400" kern="1200">
-                <a:solidFill>
-                  <a:schemeClr val="tx1"/>
-                </a:solidFill>
-                <a:latin typeface="+mj-lt"/>
-                <a:ea typeface="+mj-ea"/>
-                <a:cs typeface="+mj-cs"/>
-              </a:defRPr>
-            </a:lvl1pPr>
-          </a:lstStyle>
-          <a:p>
-            <a:pPr algn="ctr">
-              <a:lnSpc>
-                <a:spcPts val="4000"/>
-              </a:lnSpc>
-            </a:pPr>
-            <a:r>
-              <a:rPr lang="zh-TW" altLang="en-US" sz="3200" dirty="0">
-                <a:solidFill>
-                  <a:schemeClr val="bg1"/>
-                </a:solidFill>
-                <a:latin typeface="Arial" panose="020B0604020202020204" pitchFamily="34" charset="0"/>
-                <a:ea typeface="微軟正黑體" panose="020B0604030504040204" pitchFamily="34" charset="-120"/>
-              </a:rPr>
-              <a:t>專案展示</a:t>
-            </a:r>
-          </a:p>
-        </p:txBody>
-      </p:sp>
-      <p:sp>
-        <p:nvSpPr>
-          <p:cNvPr id="14" name="標題 1">
-            <a:extLst>
-              <a:ext uri="{FF2B5EF4-FFF2-40B4-BE49-F238E27FC236}">
-                <a16:creationId xmlns:a16="http://schemas.microsoft.com/office/drawing/2014/main" id="{093F271D-5378-4C3C-B786-04070B80AC8C}"/>
-              </a:ext>
-            </a:extLst>
-          </p:cNvPr>
-          <p:cNvSpPr txBox="1">
-            <a:spLocks/>
-          </p:cNvSpPr>
-          <p:nvPr/>
-        </p:nvSpPr>
-        <p:spPr>
-          <a:xfrm>
-            <a:off x="6822325" y="2754363"/>
-            <a:ext cx="5369675" cy="1349274"/>
-          </a:xfrm>
-          <a:prstGeom prst="rect">
-            <a:avLst/>
-          </a:prstGeom>
-        </p:spPr>
-        <p:txBody>
-          <a:bodyPr vert="horz" lIns="91440" tIns="45720" rIns="91440" bIns="45720" rtlCol="0" anchor="t">
-            <a:normAutofit/>
-          </a:bodyPr>
-          <a:lstStyle>
-            <a:lvl1pPr algn="l" defTabSz="914400" rtl="0" eaLnBrk="1" latinLnBrk="0" hangingPunct="1">
-              <a:lnSpc>
-                <a:spcPct val="90000"/>
-              </a:lnSpc>
-              <a:spcBef>
-                <a:spcPct val="0"/>
-              </a:spcBef>
-              <a:buNone/>
-              <a:defRPr sz="4400" kern="1200">
-                <a:solidFill>
-                  <a:schemeClr val="tx1"/>
-                </a:solidFill>
-                <a:latin typeface="+mj-lt"/>
-                <a:ea typeface="+mj-ea"/>
-                <a:cs typeface="+mj-cs"/>
-              </a:defRPr>
-            </a:lvl1pPr>
-          </a:lstStyle>
-          <a:p>
-            <a:r>
-              <a:rPr lang="zh-TW" altLang="en-US" sz="3200" b="1" dirty="0">
-                <a:latin typeface="Arial" panose="020B0604020202020204" pitchFamily="34" charset="0"/>
-                <a:ea typeface="微軟正黑體" panose="020B0604030504040204" pitchFamily="34" charset="-120"/>
-              </a:rPr>
-              <a:t>刪除記錄功能：</a:t>
-            </a:r>
-            <a:endParaRPr lang="en-US" altLang="zh-TW" sz="3200" b="1" dirty="0">
-              <a:latin typeface="Arial" panose="020B0604020202020204" pitchFamily="34" charset="0"/>
-              <a:ea typeface="微軟正黑體" panose="020B0604030504040204" pitchFamily="34" charset="-120"/>
-            </a:endParaRPr>
-          </a:p>
-          <a:p>
-            <a:r>
-              <a:rPr lang="zh-TW" altLang="en-US" sz="2800" dirty="0">
-                <a:latin typeface="Arial" panose="020B0604020202020204" pitchFamily="34" charset="0"/>
-                <a:ea typeface="微軟正黑體" panose="020B0604030504040204" pitchFamily="34" charset="-120"/>
-              </a:rPr>
-              <a:t>按下記錄旁邊的刪除按鈕把該筆記錄刪除。</a:t>
-            </a:r>
-          </a:p>
-        </p:txBody>
-      </p:sp>
-      <p:sp>
-        <p:nvSpPr>
-          <p:cNvPr id="15" name="箭號: 向右 14">
-            <a:extLst>
-              <a:ext uri="{FF2B5EF4-FFF2-40B4-BE49-F238E27FC236}">
-                <a16:creationId xmlns:a16="http://schemas.microsoft.com/office/drawing/2014/main" id="{51643FB9-EBDA-E4A3-8E13-D5A20486E7FD}"/>
-              </a:ext>
-            </a:extLst>
-          </p:cNvPr>
-          <p:cNvSpPr/>
-          <p:nvPr/>
-        </p:nvSpPr>
-        <p:spPr>
-          <a:xfrm>
-            <a:off x="3251273" y="3664980"/>
-            <a:ext cx="579120" cy="284480"/>
-          </a:xfrm>
-          <a:prstGeom prst="rightArrow">
-            <a:avLst/>
-          </a:prstGeom>
-          <a:solidFill>
-            <a:schemeClr val="tx1"/>
-          </a:solidFill>
-        </p:spPr>
-        <p:style>
-          <a:lnRef idx="2">
-            <a:schemeClr val="accent1">
-              <a:shade val="15000"/>
-            </a:schemeClr>
-          </a:lnRef>
-          <a:fillRef idx="1">
-            <a:schemeClr val="accent1"/>
-          </a:fillRef>
-          <a:effectRef idx="0">
-            <a:schemeClr val="accent1"/>
-          </a:effectRef>
-          <a:fontRef idx="minor">
-            <a:schemeClr val="lt1"/>
-          </a:fontRef>
-        </p:style>
-        <p:txBody>
-          <a:bodyPr rtlCol="0" anchor="ctr"/>
-          <a:lstStyle/>
-          <a:p>
-            <a:pPr algn="ctr"/>
-            <a:endParaRPr lang="zh-TW" altLang="en-US"/>
-          </a:p>
-        </p:txBody>
-      </p:sp>
-    </p:spTree>
-    <p:extLst>
-      <p:ext uri="{BB962C8B-B14F-4D97-AF65-F5344CB8AC3E}">
-        <p14:creationId xmlns:p14="http://schemas.microsoft.com/office/powerpoint/2010/main" val="641488597"/>
-      </p:ext>
-    </p:extLst>
-  </p:cSld>
-  <p:clrMapOvr>
-    <a:masterClrMapping/>
-  </p:clrMapOvr>
-</p:sld>
-</file>
-
-<file path=ppt/slides/slide7.xml><?xml version="1.0" encoding="utf-8"?>
 <p:sld xmlns:a="http://schemas.openxmlformats.org/drawingml/2006/main" xmlns:r="http://schemas.openxmlformats.org/officeDocument/2006/relationships" xmlns:p="http://schemas.openxmlformats.org/presentationml/2006/main">
   <p:cSld>
     <p:spTree>

</xml_diff>